<commit_message>
Finish up Unit 3 live work
</commit_message>
<xml_diff>
--- a/Unit03/Chad_Madding_Unit 3 For Live Session.pptx
+++ b/Unit03/Chad_Madding_Unit 3 For Live Session.pptx
@@ -214,7 +214,7 @@
           <a:p>
             <a:fld id="{F91415B4-81E4-4AC4-90AB-397CCE382C1C}" type="datetimeFigureOut">
               <a:rPr lang="en-US" smtClean="0"/>
-              <a:t>1/16/2020</a:t>
+              <a:t>1/18/2020</a:t>
             </a:fld>
             <a:endParaRPr lang="en-US"/>
           </a:p>
@@ -693,7 +693,7 @@
           <a:p>
             <a:fld id="{1D8BD707-D9CF-40AE-B4C6-C98DA3205C09}" type="datetimeFigureOut">
               <a:rPr lang="en-US"/>
-              <a:t>1/16/2020</a:t>
+              <a:t>1/18/2020</a:t>
             </a:fld>
             <a:endParaRPr lang="en-US"/>
           </a:p>
@@ -870,7 +870,7 @@
           <a:p>
             <a:fld id="{1D8BD707-D9CF-40AE-B4C6-C98DA3205C09}" type="datetimeFigureOut">
               <a:rPr lang="en-US"/>
-              <a:t>1/16/2020</a:t>
+              <a:t>1/18/2020</a:t>
             </a:fld>
             <a:endParaRPr lang="en-US"/>
           </a:p>
@@ -1084,7 +1084,7 @@
           <a:p>
             <a:fld id="{1D8BD707-D9CF-40AE-B4C6-C98DA3205C09}" type="datetimeFigureOut">
               <a:rPr lang="en-US"/>
-              <a:t>1/16/2020</a:t>
+              <a:t>1/18/2020</a:t>
             </a:fld>
             <a:endParaRPr lang="en-US"/>
           </a:p>
@@ -1232,7 +1232,7 @@
           <a:p>
             <a:fld id="{1D8BD707-D9CF-40AE-B4C6-C98DA3205C09}" type="datetimeFigureOut">
               <a:rPr lang="en-US"/>
-              <a:t>1/16/2020</a:t>
+              <a:t>1/18/2020</a:t>
             </a:fld>
             <a:endParaRPr lang="en-US"/>
           </a:p>
@@ -1351,7 +1351,7 @@
           <a:p>
             <a:fld id="{1D8BD707-D9CF-40AE-B4C6-C98DA3205C09}" type="datetimeFigureOut">
               <a:rPr lang="en-US"/>
-              <a:t>1/16/2020</a:t>
+              <a:t>1/18/2020</a:t>
             </a:fld>
             <a:endParaRPr lang="en-US"/>
           </a:p>
@@ -1668,7 +1668,7 @@
           <a:p>
             <a:fld id="{1D8BD707-D9CF-40AE-B4C6-C98DA3205C09}" type="datetimeFigureOut">
               <a:rPr lang="en-US"/>
-              <a:t>1/16/2020</a:t>
+              <a:t>1/18/2020</a:t>
             </a:fld>
             <a:endParaRPr lang="en-US"/>
           </a:p>
@@ -2324,7 +2324,7 @@
           <a:p>
             <a:r>
               <a:rPr lang="en-US" sz="1200" dirty="0"/>
-              <a:t>Evidence of the annual seasonal trend in the series is found in the ACF (of all the data, on the top) with a spike in the autocorrelation at lag 12.</a:t>
+              <a:t>Evidence of the annual seasonal trend in the series is found in the ACF (of all the data, to the far right) with a spike in the autocorrelation at lag 12.</a:t>
             </a:r>
           </a:p>
           <a:p>
@@ -2589,7 +2589,7 @@
           <a:p>
             <a:r>
               <a:rPr lang="en-US" sz="1200" dirty="0"/>
-              <a:t>There also looks to be evidence of a peak in the spectral density at .25 and .41.  These would correspond to a period of 4 and 2.4. Since this data has been grouped by months this is evidence of some weekly seasonality.</a:t>
+              <a:t>There also looks to be evidence of a peak in the spectral density at .25 and .41. These would correspond to a period of 4 and 2.4. Since this data has been grouped by months this is evidence of some weekly seasonality.</a:t>
             </a:r>
           </a:p>
         </p:txBody>
@@ -2723,6 +2723,404 @@
           </a:p>
         </p:txBody>
       </p:sp>
+      <p:sp>
+        <p:nvSpPr>
+          <p:cNvPr id="5" name="Rectangle 4">
+            <a:extLst>
+              <a:ext uri="{FF2B5EF4-FFF2-40B4-BE49-F238E27FC236}">
+                <a16:creationId xmlns:a16="http://schemas.microsoft.com/office/drawing/2014/main" id="{BBD66BCD-4E76-4976-AC1F-F75C450C6E33}"/>
+              </a:ext>
+            </a:extLst>
+          </p:cNvPr>
+          <p:cNvSpPr/>
+          <p:nvPr/>
+        </p:nvSpPr>
+        <p:spPr>
+          <a:xfrm>
+            <a:off x="990600" y="914400"/>
+            <a:ext cx="2514600" cy="369332"/>
+          </a:xfrm>
+          <a:prstGeom prst="rect">
+            <a:avLst/>
+          </a:prstGeom>
+        </p:spPr>
+        <p:txBody>
+          <a:bodyPr wrap="square">
+            <a:spAutoFit/>
+          </a:bodyPr>
+          <a:lstStyle/>
+          <a:p>
+            <a:r>
+              <a:rPr lang="en-US" dirty="0"/>
+              <a:t>5-Point Moving Average</a:t>
+            </a:r>
+          </a:p>
+        </p:txBody>
+      </p:sp>
+      <p:sp>
+        <p:nvSpPr>
+          <p:cNvPr id="6" name="Rectangle 5">
+            <a:extLst>
+              <a:ext uri="{FF2B5EF4-FFF2-40B4-BE49-F238E27FC236}">
+                <a16:creationId xmlns:a16="http://schemas.microsoft.com/office/drawing/2014/main" id="{49A68A6A-2615-4A44-A5A3-4B76376FFA12}"/>
+              </a:ext>
+            </a:extLst>
+          </p:cNvPr>
+          <p:cNvSpPr/>
+          <p:nvPr/>
+        </p:nvSpPr>
+        <p:spPr>
+          <a:xfrm>
+            <a:off x="5410200" y="914400"/>
+            <a:ext cx="2514600" cy="369332"/>
+          </a:xfrm>
+          <a:prstGeom prst="rect">
+            <a:avLst/>
+          </a:prstGeom>
+        </p:spPr>
+        <p:txBody>
+          <a:bodyPr wrap="square">
+            <a:spAutoFit/>
+          </a:bodyPr>
+          <a:lstStyle/>
+          <a:p>
+            <a:r>
+              <a:rPr lang="en-US" dirty="0"/>
+              <a:t>51-Point moving average</a:t>
+            </a:r>
+          </a:p>
+        </p:txBody>
+      </p:sp>
+      <p:sp>
+        <p:nvSpPr>
+          <p:cNvPr id="2" name="Rectangle 1">
+            <a:extLst>
+              <a:ext uri="{FF2B5EF4-FFF2-40B4-BE49-F238E27FC236}">
+                <a16:creationId xmlns:a16="http://schemas.microsoft.com/office/drawing/2014/main" id="{B3E2416F-2F42-42A2-A523-A863CB5FE4B3}"/>
+              </a:ext>
+            </a:extLst>
+          </p:cNvPr>
+          <p:cNvSpPr/>
+          <p:nvPr/>
+        </p:nvSpPr>
+        <p:spPr>
+          <a:xfrm>
+            <a:off x="228600" y="5077361"/>
+            <a:ext cx="3505200" cy="1323439"/>
+          </a:xfrm>
+          <a:prstGeom prst="rect">
+            <a:avLst/>
+          </a:prstGeom>
+        </p:spPr>
+        <p:txBody>
+          <a:bodyPr wrap="square">
+            <a:spAutoFit/>
+          </a:bodyPr>
+          <a:lstStyle/>
+          <a:p>
+            <a:r>
+              <a:rPr lang="en-US" sz="1000" dirty="0"/>
+              <a:t>#Setup a 5 Point Moving Average Filter</a:t>
+            </a:r>
+          </a:p>
+          <a:p>
+            <a:r>
+              <a:rPr lang="en-US" sz="1000" dirty="0"/>
+              <a:t>ma5 = stats::filter(Stor8Item1_grouped$mean_sales,rep(1,5))/5</a:t>
+            </a:r>
+          </a:p>
+          <a:p>
+            <a:r>
+              <a:rPr lang="en-US" sz="1000" dirty="0"/>
+              <a:t>ma5 = </a:t>
+            </a:r>
+            <a:r>
+              <a:rPr lang="en-US" sz="1000" dirty="0" err="1"/>
+              <a:t>na.remove</a:t>
+            </a:r>
+            <a:r>
+              <a:rPr lang="en-US" sz="1000" dirty="0"/>
+              <a:t>(ma5)</a:t>
+            </a:r>
+          </a:p>
+          <a:p>
+            <a:endParaRPr lang="en-US" sz="1000" dirty="0"/>
+          </a:p>
+          <a:p>
+            <a:r>
+              <a:rPr lang="en-US" sz="1000" dirty="0"/>
+              <a:t>#Plot the Low Pass 5 Point Moving Average</a:t>
+            </a:r>
+          </a:p>
+          <a:p>
+            <a:r>
+              <a:rPr lang="en-US" sz="1000" dirty="0"/>
+              <a:t>plot(ma5,type = 'l')</a:t>
+            </a:r>
+          </a:p>
+          <a:p>
+            <a:r>
+              <a:rPr lang="en-US" sz="1000" dirty="0" err="1"/>
+              <a:t>parzen.wge</a:t>
+            </a:r>
+            <a:r>
+              <a:rPr lang="en-US" sz="1000" dirty="0"/>
+              <a:t>(ma5)</a:t>
+            </a:r>
+          </a:p>
+          <a:p>
+            <a:r>
+              <a:rPr lang="en-US" sz="1000" dirty="0" err="1"/>
+              <a:t>plotts.sample.wge</a:t>
+            </a:r>
+            <a:r>
+              <a:rPr lang="en-US" sz="1000" dirty="0"/>
+              <a:t>(ma5)</a:t>
+            </a:r>
+          </a:p>
+        </p:txBody>
+      </p:sp>
+      <p:sp>
+        <p:nvSpPr>
+          <p:cNvPr id="7" name="Rectangle 6">
+            <a:extLst>
+              <a:ext uri="{FF2B5EF4-FFF2-40B4-BE49-F238E27FC236}">
+                <a16:creationId xmlns:a16="http://schemas.microsoft.com/office/drawing/2014/main" id="{155DE93D-3E7E-4B70-982A-7A8E46B9746A}"/>
+              </a:ext>
+            </a:extLst>
+          </p:cNvPr>
+          <p:cNvSpPr/>
+          <p:nvPr/>
+        </p:nvSpPr>
+        <p:spPr>
+          <a:xfrm>
+            <a:off x="4572000" y="5077361"/>
+            <a:ext cx="3733800" cy="1323439"/>
+          </a:xfrm>
+          <a:prstGeom prst="rect">
+            <a:avLst/>
+          </a:prstGeom>
+        </p:spPr>
+        <p:txBody>
+          <a:bodyPr wrap="square">
+            <a:spAutoFit/>
+          </a:bodyPr>
+          <a:lstStyle/>
+          <a:p>
+            <a:r>
+              <a:rPr lang="en-US" sz="1000" dirty="0"/>
+              <a:t>#Setup a 51 Point Moving Average Filter</a:t>
+            </a:r>
+          </a:p>
+          <a:p>
+            <a:r>
+              <a:rPr lang="en-US" sz="1000" dirty="0"/>
+              <a:t>ma51 = stats::filter(Stor8Item1_grouped$mean_sales,rep(1,51))/51</a:t>
+            </a:r>
+          </a:p>
+          <a:p>
+            <a:r>
+              <a:rPr lang="en-US" sz="1000" dirty="0"/>
+              <a:t>ma51 = </a:t>
+            </a:r>
+            <a:r>
+              <a:rPr lang="en-US" sz="1000" dirty="0" err="1"/>
+              <a:t>na.remove</a:t>
+            </a:r>
+            <a:r>
+              <a:rPr lang="en-US" sz="1000" dirty="0"/>
+              <a:t>(ma51)</a:t>
+            </a:r>
+          </a:p>
+          <a:p>
+            <a:endParaRPr lang="en-US" sz="1000" dirty="0"/>
+          </a:p>
+          <a:p>
+            <a:r>
+              <a:rPr lang="en-US" sz="1000" dirty="0"/>
+              <a:t>#Plot the Low Pass 51 Point Moving Average</a:t>
+            </a:r>
+          </a:p>
+          <a:p>
+            <a:r>
+              <a:rPr lang="en-US" sz="1000" dirty="0"/>
+              <a:t>plot(ma51,type = 'l')</a:t>
+            </a:r>
+          </a:p>
+          <a:p>
+            <a:r>
+              <a:rPr lang="en-US" sz="1000" dirty="0" err="1"/>
+              <a:t>parzen.wge</a:t>
+            </a:r>
+            <a:r>
+              <a:rPr lang="en-US" sz="1000" dirty="0"/>
+              <a:t>(ma51)</a:t>
+            </a:r>
+          </a:p>
+          <a:p>
+            <a:r>
+              <a:rPr lang="en-US" sz="1000" dirty="0" err="1"/>
+              <a:t>plotts.sample.wge</a:t>
+            </a:r>
+            <a:r>
+              <a:rPr lang="en-US" sz="1000" dirty="0"/>
+              <a:t>(ma51)</a:t>
+            </a:r>
+          </a:p>
+        </p:txBody>
+      </p:sp>
+      <p:pic>
+        <p:nvPicPr>
+          <p:cNvPr id="8" name="Picture 7">
+            <a:extLst>
+              <a:ext uri="{FF2B5EF4-FFF2-40B4-BE49-F238E27FC236}">
+                <a16:creationId xmlns:a16="http://schemas.microsoft.com/office/drawing/2014/main" id="{B3303F30-1935-4FBD-8B0C-B84A2101D9F9}"/>
+              </a:ext>
+            </a:extLst>
+          </p:cNvPr>
+          <p:cNvPicPr>
+            <a:picLocks noChangeAspect="1"/>
+          </p:cNvPicPr>
+          <p:nvPr/>
+        </p:nvPicPr>
+        <p:blipFill>
+          <a:blip r:embed="rId3"/>
+          <a:stretch>
+            <a:fillRect/>
+          </a:stretch>
+        </p:blipFill>
+        <p:spPr>
+          <a:xfrm>
+            <a:off x="457200" y="1281505"/>
+            <a:ext cx="3276600" cy="1842695"/>
+          </a:xfrm>
+          <a:prstGeom prst="rect">
+            <a:avLst/>
+          </a:prstGeom>
+        </p:spPr>
+      </p:pic>
+      <p:pic>
+        <p:nvPicPr>
+          <p:cNvPr id="9" name="Picture 8">
+            <a:extLst>
+              <a:ext uri="{FF2B5EF4-FFF2-40B4-BE49-F238E27FC236}">
+                <a16:creationId xmlns:a16="http://schemas.microsoft.com/office/drawing/2014/main" id="{5DF1191C-48CA-4267-8571-6F266610D7A8}"/>
+              </a:ext>
+            </a:extLst>
+          </p:cNvPr>
+          <p:cNvPicPr>
+            <a:picLocks noChangeAspect="1"/>
+          </p:cNvPicPr>
+          <p:nvPr/>
+        </p:nvPicPr>
+        <p:blipFill>
+          <a:blip r:embed="rId4"/>
+          <a:stretch>
+            <a:fillRect/>
+          </a:stretch>
+        </p:blipFill>
+        <p:spPr>
+          <a:xfrm>
+            <a:off x="4876800" y="1260293"/>
+            <a:ext cx="3268221" cy="1863907"/>
+          </a:xfrm>
+          <a:prstGeom prst="rect">
+            <a:avLst/>
+          </a:prstGeom>
+        </p:spPr>
+      </p:pic>
+      <p:sp>
+        <p:nvSpPr>
+          <p:cNvPr id="10" name="Rectangle 9">
+            <a:extLst>
+              <a:ext uri="{FF2B5EF4-FFF2-40B4-BE49-F238E27FC236}">
+                <a16:creationId xmlns:a16="http://schemas.microsoft.com/office/drawing/2014/main" id="{8BA76BFB-866F-45BA-BDF5-FFAA6E75D6C7}"/>
+              </a:ext>
+            </a:extLst>
+          </p:cNvPr>
+          <p:cNvSpPr/>
+          <p:nvPr/>
+        </p:nvSpPr>
+        <p:spPr>
+          <a:xfrm>
+            <a:off x="152399" y="3124200"/>
+            <a:ext cx="4126637" cy="1631216"/>
+          </a:xfrm>
+          <a:prstGeom prst="rect">
+            <a:avLst/>
+          </a:prstGeom>
+        </p:spPr>
+        <p:txBody>
+          <a:bodyPr wrap="square">
+            <a:spAutoFit/>
+          </a:bodyPr>
+          <a:lstStyle/>
+          <a:p>
+            <a:r>
+              <a:rPr lang="en-US" sz="1200" b="1" u="sng" dirty="0"/>
+              <a:t>Spectral Density of a 5-Point Moving Average:</a:t>
+            </a:r>
+          </a:p>
+          <a:p>
+            <a:r>
+              <a:rPr lang="en-US" sz="1100" dirty="0"/>
+              <a:t>There is still a peak in the spectral density at 0 which is evidence of some wandering behavior that is apparent in the realization.</a:t>
+            </a:r>
+          </a:p>
+          <a:p>
+            <a:r>
+              <a:rPr lang="en-US" sz="1100" dirty="0"/>
+              <a:t>There is also evidence of cyclic behavior in the realization which is supported both by our intuition and the spectral density. The peek around .083 which is indicative of a period at 1/.083 = 12, showing evidence of some monthly seasonality, is starting to fade. </a:t>
+            </a:r>
+          </a:p>
+          <a:p>
+            <a:r>
+              <a:rPr lang="en-US" sz="1100" dirty="0"/>
+              <a:t>The other two peak in the spectral density at .25 and .41 are also smoothing out.</a:t>
+            </a:r>
+          </a:p>
+        </p:txBody>
+      </p:sp>
+      <p:sp>
+        <p:nvSpPr>
+          <p:cNvPr id="11" name="Rectangle 10">
+            <a:extLst>
+              <a:ext uri="{FF2B5EF4-FFF2-40B4-BE49-F238E27FC236}">
+                <a16:creationId xmlns:a16="http://schemas.microsoft.com/office/drawing/2014/main" id="{48BC00FE-F797-4DC5-BD14-AE9101C67D4E}"/>
+              </a:ext>
+            </a:extLst>
+          </p:cNvPr>
+          <p:cNvSpPr/>
+          <p:nvPr/>
+        </p:nvSpPr>
+        <p:spPr>
+          <a:xfrm>
+            <a:off x="4279036" y="3124200"/>
+            <a:ext cx="4126637" cy="1292662"/>
+          </a:xfrm>
+          <a:prstGeom prst="rect">
+            <a:avLst/>
+          </a:prstGeom>
+        </p:spPr>
+        <p:txBody>
+          <a:bodyPr wrap="square">
+            <a:spAutoFit/>
+          </a:bodyPr>
+          <a:lstStyle/>
+          <a:p>
+            <a:r>
+              <a:rPr lang="en-US" sz="1200" b="1" u="sng" dirty="0"/>
+              <a:t>Spectral Density of a 51-Point Moving Average:</a:t>
+            </a:r>
+          </a:p>
+          <a:p>
+            <a:r>
+              <a:rPr lang="en-US" sz="1100" dirty="0"/>
+              <a:t>With so much information being taken away with such a large smoothing number about the only information we can see here is there still seems to be some evidence of some wandering behavior with a peak in the spectral density at 0. There are small breaks at .2, .3 and .4 which could be seen more predominately in the 5-Point Moving Average.</a:t>
+            </a:r>
+          </a:p>
+        </p:txBody>
+      </p:sp>
     </p:spTree>
     <p:extLst>
       <p:ext uri="{BB962C8B-B14F-4D97-AF65-F5344CB8AC3E}">
@@ -3178,7 +3576,7 @@
         <p:spPr bwMode="auto">
           <a:xfrm>
             <a:off x="1943101" y="5239512"/>
-            <a:ext cx="4906108" cy="369332"/>
+            <a:ext cx="4906108" cy="400110"/>
           </a:xfrm>
           <a:prstGeom prst="rect">
             <a:avLst/>
@@ -3242,7 +3640,25 @@
               <a:rPr lang="en-US" dirty="0">
                 <a:latin typeface="Times New Roman" pitchFamily="18" charset="0"/>
               </a:rPr>
-              <a:t>= __ (</a:t>
+              <a:t>= </a:t>
+            </a:r>
+            <a:r>
+              <a:rPr lang="en-US" sz="2000" b="1" dirty="0">
+                <a:solidFill>
+                  <a:schemeClr val="accent3">
+                    <a:lumMod val="75000"/>
+                  </a:schemeClr>
+                </a:solidFill>
+                <a:latin typeface="Arial" panose="020B0604020202020204" pitchFamily="34" charset="0"/>
+                <a:cs typeface="Arial" panose="020B0604020202020204" pitchFamily="34" charset="0"/>
+              </a:rPr>
+              <a:t>0</a:t>
+            </a:r>
+            <a:r>
+              <a:rPr lang="en-US" dirty="0">
+                <a:latin typeface="Times New Roman" pitchFamily="18" charset="0"/>
+              </a:rPr>
+              <a:t> (</a:t>
             </a:r>
             <a:r>
               <a:rPr lang="en-US" i="1" dirty="0">
@@ -3260,29 +3676,41 @@
               <a:rPr lang="en-US" dirty="0">
                 <a:latin typeface="Symbol" pitchFamily="18" charset="2"/>
               </a:rPr>
-              <a:t>&gt; 0)  </a:t>
+              <a:t>&gt; 0) </a:t>
+            </a:r>
+            <a:r>
+              <a:rPr lang="en-US" dirty="0"/>
+              <a:t>or </a:t>
             </a:r>
             <a:r>
               <a:rPr lang="en-US" i="1" dirty="0">
                 <a:latin typeface="Times New Roman" pitchFamily="18" charset="0"/>
               </a:rPr>
-              <a:t> </a:t>
-            </a:r>
-            <a:r>
-              <a:rPr lang="en-US" dirty="0"/>
-              <a:t>or </a:t>
-            </a:r>
-            <a:r>
-              <a:rPr lang="en-US" i="1" dirty="0">
-                <a:latin typeface="Times New Roman" pitchFamily="18" charset="0"/>
-              </a:rPr>
               <a:t>f</a:t>
             </a:r>
             <a:r>
               <a:rPr lang="en-US" dirty="0">
                 <a:latin typeface="Times New Roman" pitchFamily="18" charset="0"/>
               </a:rPr>
-              <a:t> =____ (</a:t>
+              <a:t> = </a:t>
+            </a:r>
+            <a:r>
+              <a:rPr lang="en-US" b="1" dirty="0">
+                <a:solidFill>
+                  <a:schemeClr val="accent3">
+                    <a:lumMod val="75000"/>
+                  </a:schemeClr>
+                </a:solidFill>
+                <a:latin typeface="Arial" panose="020B0604020202020204" pitchFamily="34" charset="0"/>
+                <a:cs typeface="Arial" panose="020B0604020202020204" pitchFamily="34" charset="0"/>
+              </a:rPr>
+              <a:t>0.5</a:t>
+            </a:r>
+            <a:r>
+              <a:rPr lang="en-US" dirty="0">
+                <a:latin typeface="Times New Roman" pitchFamily="18" charset="0"/>
+              </a:rPr>
+              <a:t> (</a:t>
             </a:r>
             <a:r>
               <a:rPr lang="en-US" i="1" dirty="0">
@@ -3408,7 +3836,7 @@
             <p:spPr bwMode="auto">
               <a:xfrm>
                 <a:off x="1943100" y="2081956"/>
-                <a:ext cx="3040749" cy="369332"/>
+                <a:ext cx="3040749" cy="400110"/>
               </a:xfrm>
               <a:prstGeom prst="rect">
                 <a:avLst/>
@@ -3463,21 +3891,7 @@
                     <a:latin typeface="Arial" panose="020B0604020202020204" pitchFamily="34" charset="0"/>
                     <a:cs typeface="Arial" panose="020B0604020202020204" pitchFamily="34" charset="0"/>
                   </a:rPr>
-                  <a:t>Stationary </a:t>
-                </a:r>
-                <a:r>
-                  <a:rPr lang="en-US" dirty="0" err="1">
-                    <a:latin typeface="Arial" panose="020B0604020202020204" pitchFamily="34" charset="0"/>
-                    <a:cs typeface="Arial" panose="020B0604020202020204" pitchFamily="34" charset="0"/>
-                  </a:rPr>
-                  <a:t>iff</a:t>
-                </a:r>
-                <a:r>
-                  <a:rPr lang="en-US" dirty="0">
-                    <a:latin typeface="Arial" panose="020B0604020202020204" pitchFamily="34" charset="0"/>
-                    <a:cs typeface="Arial" panose="020B0604020202020204" pitchFamily="34" charset="0"/>
-                  </a:rPr>
-                  <a:t> |</a:t>
+                  <a:t>Stationary if |</a:t>
                 </a:r>
                 <a14:m>
                   <m:oMath xmlns:m="http://schemas.openxmlformats.org/officeDocument/2006/math">
@@ -3517,7 +3931,26 @@
                     <a:latin typeface="Arial" panose="020B0604020202020204" pitchFamily="34" charset="0"/>
                     <a:cs typeface="Arial" panose="020B0604020202020204" pitchFamily="34" charset="0"/>
                   </a:rPr>
-                  <a:t>| ______ </a:t>
+                  <a:t>|   </a:t>
+                </a:r>
+                <a:r>
+                  <a:rPr lang="en-US" sz="2000" b="1" dirty="0">
+                    <a:solidFill>
+                      <a:schemeClr val="accent3">
+                        <a:lumMod val="75000"/>
+                      </a:schemeClr>
+                    </a:solidFill>
+                    <a:latin typeface="Arial" panose="020B0604020202020204" pitchFamily="34" charset="0"/>
+                    <a:cs typeface="Arial" panose="020B0604020202020204" pitchFamily="34" charset="0"/>
+                  </a:rPr>
+                  <a:t>&lt;1</a:t>
+                </a:r>
+                <a:r>
+                  <a:rPr lang="en-US" dirty="0">
+                    <a:latin typeface="Arial" panose="020B0604020202020204" pitchFamily="34" charset="0"/>
+                    <a:cs typeface="Arial" panose="020B0604020202020204" pitchFamily="34" charset="0"/>
+                  </a:rPr>
+                  <a:t> </a:t>
                 </a:r>
               </a:p>
             </p:txBody>
@@ -3535,7 +3968,7 @@
             <p:spPr bwMode="auto">
               <a:xfrm>
                 <a:off x="1943100" y="2081956"/>
-                <a:ext cx="3040749" cy="369332"/>
+                <a:ext cx="3040749" cy="400110"/>
               </a:xfrm>
               <a:prstGeom prst="rect">
                 <a:avLst/>
@@ -3543,7 +3976,7 @@
               <a:blipFill>
                 <a:blip r:embed="rId3"/>
                 <a:stretch>
-                  <a:fillRect l="-1667" t="-6667" b="-23333"/>
+                  <a:fillRect l="-1804" t="-7692" b="-29231"/>
                 </a:stretch>
               </a:blipFill>
               <a:ln>
@@ -3679,7 +4112,7 @@
         <p:spPr bwMode="auto">
           <a:xfrm>
             <a:off x="1943100" y="4104338"/>
-            <a:ext cx="3429000" cy="369332"/>
+            <a:ext cx="6972300" cy="369332"/>
           </a:xfrm>
           <a:prstGeom prst="rect">
             <a:avLst/>
@@ -3749,9 +4182,42 @@
               <a:rPr lang="en-US" dirty="0">
                 <a:latin typeface="Symbol" pitchFamily="18" charset="2"/>
               </a:rPr>
-              <a:t>&gt; 0 :</a:t>
-            </a:r>
-            <a:endParaRPr lang="en-US" dirty="0"/>
+              <a:t>&gt; 0 : </a:t>
+            </a:r>
+            <a:r>
+              <a:rPr lang="en-US" dirty="0"/>
+              <a:t>Seem to be “</a:t>
+            </a:r>
+            <a:r>
+              <a:rPr lang="en-US" b="1" dirty="0">
+                <a:solidFill>
+                  <a:schemeClr val="accent3">
+                    <a:lumMod val="75000"/>
+                  </a:schemeClr>
+                </a:solidFill>
+              </a:rPr>
+              <a:t>wandering</a:t>
+            </a:r>
+            <a:r>
+              <a:rPr lang="en-US" dirty="0"/>
+              <a:t>,” aperiodic in nature. (</a:t>
+            </a:r>
+            <a:r>
+              <a:rPr lang="en-US" i="1" dirty="0">
+                <a:latin typeface="Symbol" pitchFamily="18" charset="2"/>
+              </a:rPr>
+              <a:t>j</a:t>
+            </a:r>
+            <a:r>
+              <a:rPr lang="en-US" baseline="-25000" dirty="0">
+                <a:latin typeface="Symbol" pitchFamily="18" charset="2"/>
+              </a:rPr>
+              <a:t>1 </a:t>
+            </a:r>
+            <a:r>
+              <a:rPr lang="en-US" dirty="0"/>
+              <a:t>Positive)</a:t>
+            </a:r>
           </a:p>
         </p:txBody>
       </p:sp>
@@ -3766,7 +4232,7 @@
         <p:spPr bwMode="auto">
           <a:xfrm>
             <a:off x="1943100" y="4474463"/>
-            <a:ext cx="4176347" cy="369332"/>
+            <a:ext cx="6515100" cy="369332"/>
           </a:xfrm>
           <a:prstGeom prst="rect">
             <a:avLst/>
@@ -3836,9 +4302,42 @@
               <a:rPr lang="en-US" dirty="0">
                 <a:latin typeface="Symbol" pitchFamily="18" charset="2"/>
               </a:rPr>
-              <a:t>&lt; 0 :</a:t>
-            </a:r>
-            <a:endParaRPr lang="en-US" dirty="0"/>
+              <a:t>&lt; 0 : </a:t>
+            </a:r>
+            <a:r>
+              <a:rPr lang="en-US" dirty="0"/>
+              <a:t>Seem to be “</a:t>
+            </a:r>
+            <a:r>
+              <a:rPr lang="en-US" b="1" dirty="0">
+                <a:solidFill>
+                  <a:schemeClr val="accent3">
+                    <a:lumMod val="75000"/>
+                  </a:schemeClr>
+                </a:solidFill>
+              </a:rPr>
+              <a:t>oscillating</a:t>
+            </a:r>
+            <a:r>
+              <a:rPr lang="en-US" dirty="0"/>
+              <a:t>” (</a:t>
+            </a:r>
+            <a:r>
+              <a:rPr lang="en-US" i="1" dirty="0">
+                <a:latin typeface="Symbol" pitchFamily="18" charset="2"/>
+              </a:rPr>
+              <a:t>j</a:t>
+            </a:r>
+            <a:r>
+              <a:rPr lang="en-US" baseline="-25000" dirty="0">
+                <a:latin typeface="Symbol" pitchFamily="18" charset="2"/>
+              </a:rPr>
+              <a:t>1 </a:t>
+            </a:r>
+            <a:r>
+              <a:rPr lang="en-US" dirty="0"/>
+              <a:t>Negative)</a:t>
+            </a:r>
           </a:p>
         </p:txBody>
       </p:sp>
@@ -4014,7 +4513,55 @@
                           <a:latin typeface="Cambria Math" panose="02040503050406030204" pitchFamily="18" charset="0"/>
                           <a:cs typeface="Arial" panose="020B0604020202020204" pitchFamily="34" charset="0"/>
                         </a:rPr>
-                        <m:t>=            </m:t>
+                        <m:t>=</m:t>
+                      </m:r>
+                      <m:r>
+                        <m:rPr>
+                          <m:nor/>
+                        </m:rPr>
+                        <a:rPr lang="en-US" sz="2400" b="1" i="1" dirty="0" smtClean="0">
+                          <a:solidFill>
+                            <a:schemeClr val="accent3">
+                              <a:lumMod val="75000"/>
+                            </a:schemeClr>
+                          </a:solidFill>
+                          <a:latin typeface="Symbol" pitchFamily="18" charset="2"/>
+                        </a:rPr>
+                        <m:t>j</m:t>
+                      </m:r>
+                      <m:r>
+                        <m:rPr>
+                          <m:nor/>
+                        </m:rPr>
+                        <a:rPr lang="en-US" sz="2400" b="1" baseline="-25000" dirty="0" smtClean="0">
+                          <a:solidFill>
+                            <a:schemeClr val="accent3">
+                              <a:lumMod val="75000"/>
+                            </a:schemeClr>
+                          </a:solidFill>
+                          <a:latin typeface="Symbol" pitchFamily="18" charset="2"/>
+                        </a:rPr>
+                        <m:t>1</m:t>
+                      </m:r>
+                      <m:r>
+                        <m:rPr>
+                          <m:nor/>
+                        </m:rPr>
+                        <a:rPr lang="en-US" sz="2400" b="1" i="0" baseline="30000" dirty="0" smtClean="0">
+                          <a:solidFill>
+                            <a:schemeClr val="accent3">
+                              <a:lumMod val="75000"/>
+                            </a:schemeClr>
+                          </a:solidFill>
+                          <a:latin typeface="Symbol" pitchFamily="18" charset="2"/>
+                        </a:rPr>
+                        <m:t>k</m:t>
+                      </m:r>
+                      <m:r>
+                        <a:rPr lang="en-US" sz="2400" b="0" i="1" baseline="-25000" dirty="0" smtClean="0">
+                          <a:latin typeface="Cambria Math" panose="02040503050406030204" pitchFamily="18" charset="0"/>
+                        </a:rPr>
+                        <m:t> </m:t>
                       </m:r>
                       <m:r>
                         <a:rPr lang="en-US" sz="2100" i="1">
@@ -4081,7 +4628,7 @@
               <a:blipFill>
                 <a:blip r:embed="rId4"/>
                 <a:stretch>
-                  <a:fillRect l="-962" t="-3846" r="-962" b="-38462"/>
+                  <a:fillRect b="-33962"/>
                 </a:stretch>
               </a:blipFill>
               <a:ln>
@@ -4143,7 +4690,7 @@
             <a:avLst/>
           </a:prstGeom>
           <a:blipFill>
-            <a:blip r:embed="rId3" cstate="print"/>
+            <a:blip r:embed="rId5" cstate="print"/>
             <a:stretch>
               <a:fillRect/>
             </a:stretch>
@@ -4238,18 +4785,28 @@
         </p:nvSpPr>
         <p:spPr>
           <a:xfrm>
-            <a:off x="152401" y="990600"/>
-            <a:ext cx="8763000" cy="184666"/>
+            <a:off x="304800" y="4572000"/>
+            <a:ext cx="8763000" cy="553998"/>
           </a:xfrm>
         </p:spPr>
         <p:txBody>
           <a:bodyPr/>
           <a:lstStyle/>
           <a:p>
-            <a:endParaRPr lang="en-US" sz="1200" dirty="0">
-              <a:latin typeface="Arial" panose="020B0604020202020204" pitchFamily="34" charset="0"/>
-              <a:cs typeface="Arial" panose="020B0604020202020204" pitchFamily="34" charset="0"/>
-            </a:endParaRPr>
+            <a:r>
+              <a:rPr lang="en-US" sz="1800" b="1" dirty="0">
+                <a:latin typeface="Arial" panose="020B0604020202020204" pitchFamily="34" charset="0"/>
+                <a:cs typeface="Arial" panose="020B0604020202020204" pitchFamily="34" charset="0"/>
+              </a:rPr>
+              <a:t>Question: </a:t>
+            </a:r>
+            <a:r>
+              <a:rPr lang="en-US" sz="1800" dirty="0">
+                <a:latin typeface="Arial" panose="020B0604020202020204" pitchFamily="34" charset="0"/>
+                <a:cs typeface="Arial" panose="020B0604020202020204" pitchFamily="34" charset="0"/>
+              </a:rPr>
+              <a:t>How do you work out this from the videos? I got the Root correct but could not see how the inverse of the root worked.</a:t>
+            </a:r>
           </a:p>
         </p:txBody>
       </p:sp>
@@ -4285,6 +4842,244 @@
           <a:lstStyle/>
           <a:p>
             <a:endParaRPr/>
+          </a:p>
+        </p:txBody>
+      </p:sp>
+      <p:sp>
+        <p:nvSpPr>
+          <p:cNvPr id="5" name="Rectangle 4">
+            <a:extLst>
+              <a:ext uri="{FF2B5EF4-FFF2-40B4-BE49-F238E27FC236}">
+                <a16:creationId xmlns:a16="http://schemas.microsoft.com/office/drawing/2014/main" id="{DC9D1434-DDE5-4571-B36D-8FEE7C302EB5}"/>
+              </a:ext>
+            </a:extLst>
+          </p:cNvPr>
+          <p:cNvSpPr/>
+          <p:nvPr/>
+        </p:nvSpPr>
+        <p:spPr>
+          <a:xfrm>
+            <a:off x="423540" y="5225086"/>
+            <a:ext cx="8648699" cy="923330"/>
+          </a:xfrm>
+          <a:prstGeom prst="rect">
+            <a:avLst/>
+          </a:prstGeom>
+        </p:spPr>
+        <p:txBody>
+          <a:bodyPr wrap="square">
+            <a:spAutoFit/>
+          </a:bodyPr>
+          <a:lstStyle/>
+          <a:p>
+            <a:r>
+              <a:rPr lang="en-US" b="1" i="1" dirty="0">
+                <a:latin typeface="Arial" panose="020B0604020202020204" pitchFamily="34" charset="0"/>
+                <a:cs typeface="Arial" panose="020B0604020202020204" pitchFamily="34" charset="0"/>
+              </a:rPr>
+              <a:t>What is the inverse of the root: |r|–1? Please express your response to the nearest tenth. </a:t>
+            </a:r>
+            <a:r>
+              <a:rPr lang="en-US" dirty="0">
+                <a:latin typeface="Arial" panose="020B0604020202020204" pitchFamily="34" charset="0"/>
+                <a:cs typeface="Arial" panose="020B0604020202020204" pitchFamily="34" charset="0"/>
+              </a:rPr>
+              <a:t>The answer is 1.2 so I am guessing r would have to be the AV of 2.2. I got a Z equal to -0.833 so ho do you work that back in to get r?</a:t>
+            </a:r>
+          </a:p>
+        </p:txBody>
+      </p:sp>
+      <p:sp>
+        <p:nvSpPr>
+          <p:cNvPr id="6" name="Rectangle 5">
+            <a:extLst>
+              <a:ext uri="{FF2B5EF4-FFF2-40B4-BE49-F238E27FC236}">
+                <a16:creationId xmlns:a16="http://schemas.microsoft.com/office/drawing/2014/main" id="{7B819729-3D22-4F97-8B63-031B37195776}"/>
+              </a:ext>
+            </a:extLst>
+          </p:cNvPr>
+          <p:cNvSpPr/>
+          <p:nvPr/>
+        </p:nvSpPr>
+        <p:spPr>
+          <a:xfrm>
+            <a:off x="380999" y="1751750"/>
+            <a:ext cx="8382000" cy="2585323"/>
+          </a:xfrm>
+          <a:prstGeom prst="rect">
+            <a:avLst/>
+          </a:prstGeom>
+        </p:spPr>
+        <p:txBody>
+          <a:bodyPr wrap="square">
+            <a:spAutoFit/>
+          </a:bodyPr>
+          <a:lstStyle/>
+          <a:p>
+            <a:pPr marR="730"/>
+            <a:r>
+              <a:rPr lang="en-US" b="1" i="1" dirty="0">
+                <a:latin typeface="Arial" panose="020B0604020202020204" pitchFamily="34" charset="0"/>
+              </a:rPr>
+              <a:t>Realizations </a:t>
+            </a:r>
+            <a:r>
+              <a:rPr lang="en-US" dirty="0">
+                <a:latin typeface="Arial" panose="020B0604020202020204" pitchFamily="34" charset="0"/>
+              </a:rPr>
+              <a:t>are wandering or oscillating depending on whether the root of the characteristic equation is positive or negative, respectively.</a:t>
+            </a:r>
+          </a:p>
+          <a:p>
+            <a:endParaRPr lang="en-US" dirty="0">
+              <a:latin typeface="Arial" panose="020B0604020202020204" pitchFamily="34" charset="0"/>
+            </a:endParaRPr>
+          </a:p>
+          <a:p>
+            <a:pPr marR="730"/>
+            <a:r>
+              <a:rPr lang="en-US" b="1" i="1" dirty="0">
+                <a:latin typeface="Arial" panose="020B0604020202020204" pitchFamily="34" charset="0"/>
+              </a:rPr>
+              <a:t>Autocorrelations </a:t>
+            </a:r>
+            <a:r>
+              <a:rPr lang="en-US" dirty="0">
+                <a:latin typeface="Arial" panose="020B0604020202020204" pitchFamily="34" charset="0"/>
+              </a:rPr>
+              <a:t>are damped exponentials or damped oscillating exponentials depending on whether the root of the characteristic equation is positive or negative, respectively.</a:t>
+            </a:r>
+          </a:p>
+          <a:p>
+            <a:endParaRPr lang="en-US" dirty="0">
+              <a:latin typeface="Arial" panose="020B0604020202020204" pitchFamily="34" charset="0"/>
+            </a:endParaRPr>
+          </a:p>
+          <a:p>
+            <a:pPr marR="730"/>
+            <a:r>
+              <a:rPr lang="en-US" b="1" i="1" dirty="0">
+                <a:latin typeface="Arial" panose="020B0604020202020204" pitchFamily="34" charset="0"/>
+              </a:rPr>
+              <a:t>Spectral densities </a:t>
+            </a:r>
+            <a:r>
+              <a:rPr lang="en-US" dirty="0">
+                <a:latin typeface="Arial" panose="020B0604020202020204" pitchFamily="34" charset="0"/>
+              </a:rPr>
+              <a:t>have a peak at </a:t>
+            </a:r>
+            <a:r>
+              <a:rPr lang="en-US" i="1" dirty="0">
+                <a:latin typeface="Times New Roman" panose="02020603050405020304" pitchFamily="18" charset="0"/>
+              </a:rPr>
+              <a:t>f </a:t>
+            </a:r>
+            <a:r>
+              <a:rPr lang="en-US" dirty="0">
+                <a:latin typeface="Times New Roman" panose="02020603050405020304" pitchFamily="18" charset="0"/>
+              </a:rPr>
+              <a:t>= 0 or </a:t>
+            </a:r>
+            <a:r>
+              <a:rPr lang="en-US" i="1" dirty="0">
+                <a:latin typeface="Times New Roman" panose="02020603050405020304" pitchFamily="18" charset="0"/>
+              </a:rPr>
+              <a:t>f </a:t>
+            </a:r>
+            <a:r>
+              <a:rPr lang="en-US" dirty="0">
+                <a:latin typeface="Times New Roman" panose="02020603050405020304" pitchFamily="18" charset="0"/>
+              </a:rPr>
+              <a:t>=.5 </a:t>
+            </a:r>
+            <a:r>
+              <a:rPr lang="en-US" dirty="0">
+                <a:latin typeface="Arial" panose="020B0604020202020204" pitchFamily="34" charset="0"/>
+              </a:rPr>
+              <a:t>depending on whether the root of the characteristic equation is positive or negative, respectively.</a:t>
+            </a:r>
+          </a:p>
+        </p:txBody>
+      </p:sp>
+      <p:sp>
+        <p:nvSpPr>
+          <p:cNvPr id="7" name="Title 1">
+            <a:extLst>
+              <a:ext uri="{FF2B5EF4-FFF2-40B4-BE49-F238E27FC236}">
+                <a16:creationId xmlns:a16="http://schemas.microsoft.com/office/drawing/2014/main" id="{E0F84354-9400-423A-8906-B96C1B9219FC}"/>
+              </a:ext>
+            </a:extLst>
+          </p:cNvPr>
+          <p:cNvSpPr txBox="1">
+            <a:spLocks/>
+          </p:cNvSpPr>
+          <p:nvPr/>
+        </p:nvSpPr>
+        <p:spPr>
+          <a:xfrm>
+            <a:off x="565435" y="914400"/>
+            <a:ext cx="8013129" cy="276999"/>
+          </a:xfrm>
+          <a:prstGeom prst="rect">
+            <a:avLst/>
+          </a:prstGeom>
+        </p:spPr>
+        <p:txBody>
+          <a:bodyPr wrap="square" lIns="0" tIns="0" rIns="0" bIns="0">
+            <a:spAutoFit/>
+          </a:bodyPr>
+          <a:lstStyle>
+            <a:lvl1pPr>
+              <a:defRPr sz="4400" b="0" i="0">
+                <a:solidFill>
+                  <a:schemeClr val="tx1"/>
+                </a:solidFill>
+                <a:latin typeface="Arial"/>
+                <a:ea typeface="+mj-ea"/>
+                <a:cs typeface="Arial"/>
+              </a:defRPr>
+            </a:lvl1pPr>
+          </a:lstStyle>
+          <a:p>
+            <a:r>
+              <a:rPr lang="en-US" sz="1800" kern="0" dirty="0"/>
+              <a:t>The last slide did a great job of recapping what this week 3 was about:</a:t>
+            </a:r>
+          </a:p>
+        </p:txBody>
+      </p:sp>
+      <p:sp>
+        <p:nvSpPr>
+          <p:cNvPr id="8" name="Rectangle 7">
+            <a:extLst>
+              <a:ext uri="{FF2B5EF4-FFF2-40B4-BE49-F238E27FC236}">
+                <a16:creationId xmlns:a16="http://schemas.microsoft.com/office/drawing/2014/main" id="{D925AF1D-22C8-48B1-B16E-FC5FF5E2E242}"/>
+              </a:ext>
+            </a:extLst>
+          </p:cNvPr>
+          <p:cNvSpPr/>
+          <p:nvPr/>
+        </p:nvSpPr>
+        <p:spPr>
+          <a:xfrm>
+            <a:off x="3185465" y="1295400"/>
+            <a:ext cx="2773067" cy="400110"/>
+          </a:xfrm>
+          <a:prstGeom prst="rect">
+            <a:avLst/>
+          </a:prstGeom>
+        </p:spPr>
+        <p:txBody>
+          <a:bodyPr wrap="none">
+            <a:spAutoFit/>
+          </a:bodyPr>
+          <a:lstStyle/>
+          <a:p>
+            <a:r>
+              <a:rPr lang="en-US" sz="2000" b="1" dirty="0"/>
+              <a:t>AR(1) Models: Summary</a:t>
+            </a:r>
           </a:p>
         </p:txBody>
       </p:sp>

</xml_diff>